<commit_message>
logo font in title
</commit_message>
<xml_diff>
--- a/anrw-berlin-16/pathspider-poster-mk.pptx
+++ b/anrw-berlin-16/pathspider-poster-mk.pptx
@@ -2735,6 +2735,20 @@
           <a:p>
             <a:pPr algn="ctr"/>
             <a:r>
+              <a:rPr lang="en-GB" sz="9576" b="1" spc="-1" dirty="0" err="1">
+                <a:solidFill>
+                  <a:srgbClr val="000000"/>
+                </a:solidFill>
+                <a:uFill>
+                  <a:solidFill>
+                    <a:srgbClr val="FFFFFF"/>
+                  </a:solidFill>
+                </a:uFill>
+                <a:latin typeface="Helvetica Neue"/>
+              </a:rPr>
+              <a:t>PATH</a:t>
+            </a:r>
+            <a:r>
               <a:rPr lang="en-GB" sz="9576" spc="-1" dirty="0" err="1">
                 <a:solidFill>
                   <a:srgbClr val="000000"/>
@@ -2744,9 +2758,9 @@
                     <a:srgbClr val="FFFFFF"/>
                   </a:solidFill>
                 </a:uFill>
-                <a:latin typeface="Helvetica Neue"/>
-              </a:rPr>
-              <a:t>PATHspider</a:t>
+                <a:latin typeface="Bauhaus 93" panose="04030905020B02020C02" pitchFamily="82" charset="0"/>
+              </a:rPr>
+              <a:t>spider</a:t>
             </a:r>
             <a:r>
               <a:rPr lang="en-GB" sz="9576" spc="-1" dirty="0">

</xml_diff>